<commit_message>
Your message describing the local changes
</commit_message>
<xml_diff>
--- a/plots/logit_scale.pptx
+++ b/plots/logit_scale.pptx
@@ -259,7 +259,7 @@
           <a:p>
             <a:fld id="{CD874F49-FEBB-FF42-B278-30C4F47372F7}" type="datetimeFigureOut">
               <a:rPr lang="de-DE" smtClean="0"/>
-              <a:t>26.05.25</a:t>
+              <a:t>05.06.25</a:t>
             </a:fld>
             <a:endParaRPr lang="de-DE"/>
           </a:p>
@@ -457,7 +457,7 @@
           <a:p>
             <a:fld id="{CD874F49-FEBB-FF42-B278-30C4F47372F7}" type="datetimeFigureOut">
               <a:rPr lang="de-DE" smtClean="0"/>
-              <a:t>26.05.25</a:t>
+              <a:t>05.06.25</a:t>
             </a:fld>
             <a:endParaRPr lang="de-DE"/>
           </a:p>
@@ -665,7 +665,7 @@
           <a:p>
             <a:fld id="{CD874F49-FEBB-FF42-B278-30C4F47372F7}" type="datetimeFigureOut">
               <a:rPr lang="de-DE" smtClean="0"/>
-              <a:t>26.05.25</a:t>
+              <a:t>05.06.25</a:t>
             </a:fld>
             <a:endParaRPr lang="de-DE"/>
           </a:p>
@@ -863,7 +863,7 @@
           <a:p>
             <a:fld id="{CD874F49-FEBB-FF42-B278-30C4F47372F7}" type="datetimeFigureOut">
               <a:rPr lang="de-DE" smtClean="0"/>
-              <a:t>26.05.25</a:t>
+              <a:t>05.06.25</a:t>
             </a:fld>
             <a:endParaRPr lang="de-DE"/>
           </a:p>
@@ -1138,7 +1138,7 @@
           <a:p>
             <a:fld id="{CD874F49-FEBB-FF42-B278-30C4F47372F7}" type="datetimeFigureOut">
               <a:rPr lang="de-DE" smtClean="0"/>
-              <a:t>26.05.25</a:t>
+              <a:t>05.06.25</a:t>
             </a:fld>
             <a:endParaRPr lang="de-DE"/>
           </a:p>
@@ -1403,7 +1403,7 @@
           <a:p>
             <a:fld id="{CD874F49-FEBB-FF42-B278-30C4F47372F7}" type="datetimeFigureOut">
               <a:rPr lang="de-DE" smtClean="0"/>
-              <a:t>26.05.25</a:t>
+              <a:t>05.06.25</a:t>
             </a:fld>
             <a:endParaRPr lang="de-DE"/>
           </a:p>
@@ -1815,7 +1815,7 @@
           <a:p>
             <a:fld id="{CD874F49-FEBB-FF42-B278-30C4F47372F7}" type="datetimeFigureOut">
               <a:rPr lang="de-DE" smtClean="0"/>
-              <a:t>26.05.25</a:t>
+              <a:t>05.06.25</a:t>
             </a:fld>
             <a:endParaRPr lang="de-DE"/>
           </a:p>
@@ -1956,7 +1956,7 @@
           <a:p>
             <a:fld id="{CD874F49-FEBB-FF42-B278-30C4F47372F7}" type="datetimeFigureOut">
               <a:rPr lang="de-DE" smtClean="0"/>
-              <a:t>26.05.25</a:t>
+              <a:t>05.06.25</a:t>
             </a:fld>
             <a:endParaRPr lang="de-DE"/>
           </a:p>
@@ -2069,7 +2069,7 @@
           <a:p>
             <a:fld id="{CD874F49-FEBB-FF42-B278-30C4F47372F7}" type="datetimeFigureOut">
               <a:rPr lang="de-DE" smtClean="0"/>
-              <a:t>26.05.25</a:t>
+              <a:t>05.06.25</a:t>
             </a:fld>
             <a:endParaRPr lang="de-DE"/>
           </a:p>
@@ -2380,7 +2380,7 @@
           <a:p>
             <a:fld id="{CD874F49-FEBB-FF42-B278-30C4F47372F7}" type="datetimeFigureOut">
               <a:rPr lang="de-DE" smtClean="0"/>
-              <a:t>26.05.25</a:t>
+              <a:t>05.06.25</a:t>
             </a:fld>
             <a:endParaRPr lang="de-DE"/>
           </a:p>
@@ -2668,7 +2668,7 @@
           <a:p>
             <a:fld id="{CD874F49-FEBB-FF42-B278-30C4F47372F7}" type="datetimeFigureOut">
               <a:rPr lang="de-DE" smtClean="0"/>
-              <a:t>26.05.25</a:t>
+              <a:t>05.06.25</a:t>
             </a:fld>
             <a:endParaRPr lang="de-DE"/>
           </a:p>
@@ -2909,7 +2909,7 @@
           <a:p>
             <a:fld id="{CD874F49-FEBB-FF42-B278-30C4F47372F7}" type="datetimeFigureOut">
               <a:rPr lang="de-DE" smtClean="0"/>
-              <a:t>26.05.25</a:t>
+              <a:t>05.06.25</a:t>
             </a:fld>
             <a:endParaRPr lang="de-DE"/>
           </a:p>
@@ -3370,7 +3370,7 @@
         <p:spPr>
           <a:xfrm>
             <a:off x="5416144" y="1036975"/>
-            <a:ext cx="2026875" cy="1277273"/>
+            <a:ext cx="2196768" cy="938719"/>
           </a:xfrm>
           <a:prstGeom prst="rect">
             <a:avLst/>
@@ -3384,44 +3384,14 @@
           <a:lstStyle/>
           <a:p>
             <a:r>
-              <a:rPr lang="de-DE" sz="1100" dirty="0" err="1">
+              <a:rPr lang="de-DE" sz="1100" dirty="0">
                 <a:solidFill>
                   <a:srgbClr val="55B2E7"/>
                 </a:solidFill>
                 <a:latin typeface="Helvetica" pitchFamily="2" charset="0"/>
                 <a:cs typeface="Consolas" panose="020B0609020204030204" pitchFamily="49" charset="0"/>
               </a:rPr>
-              <a:t>Comparison</a:t>
-            </a:r>
-            <a:r>
-              <a:rPr lang="de-DE" sz="1100" dirty="0">
-                <a:solidFill>
-                  <a:srgbClr val="55B2E7"/>
-                </a:solidFill>
-                <a:latin typeface="Helvetica" pitchFamily="2" charset="0"/>
-                <a:cs typeface="Consolas" panose="020B0609020204030204" pitchFamily="49" charset="0"/>
-              </a:rPr>
-              <a:t> </a:t>
-            </a:r>
-            <a:r>
-              <a:rPr lang="de-DE" sz="1100" dirty="0" err="1">
-                <a:solidFill>
-                  <a:srgbClr val="55B2E7"/>
-                </a:solidFill>
-                <a:latin typeface="Helvetica" pitchFamily="2" charset="0"/>
-                <a:cs typeface="Consolas" panose="020B0609020204030204" pitchFamily="49" charset="0"/>
-              </a:rPr>
-              <a:t>results</a:t>
-            </a:r>
-            <a:r>
-              <a:rPr lang="de-DE" sz="1100" dirty="0">
-                <a:solidFill>
-                  <a:srgbClr val="55B2E7"/>
-                </a:solidFill>
-                <a:latin typeface="Helvetica" pitchFamily="2" charset="0"/>
-                <a:cs typeface="Consolas" panose="020B0609020204030204" pitchFamily="49" charset="0"/>
-              </a:rPr>
-              <a:t> in </a:t>
+              <a:t>Risk </a:t>
             </a:r>
             <a:r>
               <a:rPr lang="de-DE" sz="1100" dirty="0" err="1">
@@ -3519,7 +3489,7 @@
                 <a:latin typeface="Helvetica" pitchFamily="2" charset="0"/>
                 <a:cs typeface="Consolas" panose="020B0609020204030204" pitchFamily="49" charset="0"/>
               </a:rPr>
-              <a:t>Relative </a:t>
+              <a:t>Risk </a:t>
             </a:r>
             <a:r>
               <a:rPr lang="de-DE" sz="1100" dirty="0" err="1">
@@ -3529,7 +3499,7 @@
                 <a:latin typeface="Helvetica" pitchFamily="2" charset="0"/>
                 <a:cs typeface="Consolas" panose="020B0609020204030204" pitchFamily="49" charset="0"/>
               </a:rPr>
-              <a:t>risk</a:t>
+              <a:t>ratio</a:t>
             </a:r>
             <a:r>
               <a:rPr lang="de-DE" sz="1100" dirty="0">
@@ -3889,8 +3859,8 @@
         </p:nvSpPr>
         <p:spPr>
           <a:xfrm>
-            <a:off x="3819832" y="2612381"/>
-            <a:ext cx="1696061" cy="1107996"/>
+            <a:off x="3819833" y="2612381"/>
+            <a:ext cx="1596312" cy="1107996"/>
           </a:xfrm>
           <a:prstGeom prst="rect">
             <a:avLst/>
@@ -3904,6 +3874,16 @@
           <a:lstStyle/>
           <a:p>
             <a:r>
+              <a:rPr lang="de-DE" sz="1100" dirty="0">
+                <a:solidFill>
+                  <a:srgbClr val="55B2E7"/>
+                </a:solidFill>
+                <a:latin typeface="Helvetica" pitchFamily="2" charset="0"/>
+                <a:cs typeface="Consolas" panose="020B0609020204030204" pitchFamily="49" charset="0"/>
+              </a:rPr>
+              <a:t>Log </a:t>
+            </a:r>
+            <a:r>
               <a:rPr lang="de-DE" sz="1100" dirty="0" err="1">
                 <a:solidFill>
                   <a:srgbClr val="55B2E7"/>
@@ -3911,7 +3891,7 @@
                 <a:latin typeface="Helvetica" pitchFamily="2" charset="0"/>
                 <a:cs typeface="Consolas" panose="020B0609020204030204" pitchFamily="49" charset="0"/>
               </a:rPr>
-              <a:t>Comparison</a:t>
+              <a:t>odds</a:t>
             </a:r>
             <a:r>
               <a:rPr lang="de-DE" sz="1100" dirty="0">
@@ -3922,26 +3902,6 @@
                 <a:cs typeface="Consolas" panose="020B0609020204030204" pitchFamily="49" charset="0"/>
               </a:rPr>
               <a:t> </a:t>
-            </a:r>
-            <a:r>
-              <a:rPr lang="de-DE" sz="1100" dirty="0" err="1">
-                <a:solidFill>
-                  <a:srgbClr val="55B2E7"/>
-                </a:solidFill>
-                <a:latin typeface="Helvetica" pitchFamily="2" charset="0"/>
-                <a:cs typeface="Consolas" panose="020B0609020204030204" pitchFamily="49" charset="0"/>
-              </a:rPr>
-              <a:t>results</a:t>
-            </a:r>
-            <a:r>
-              <a:rPr lang="de-DE" sz="1100" dirty="0">
-                <a:solidFill>
-                  <a:srgbClr val="55B2E7"/>
-                </a:solidFill>
-                <a:latin typeface="Helvetica" pitchFamily="2" charset="0"/>
-                <a:cs typeface="Consolas" panose="020B0609020204030204" pitchFamily="49" charset="0"/>
-              </a:rPr>
-              <a:t> in </a:t>
             </a:r>
             <a:r>
               <a:rPr lang="de-DE" sz="1100" dirty="0" err="1">

</xml_diff>